<commit_message>
Last minute changes before starting first class
</commit_message>
<xml_diff>
--- a/Slides/Ninject/1 - Dependency Inversion.pptx
+++ b/Slides/Ninject/1 - Dependency Inversion.pptx
@@ -5609,6 +5609,384 @@
       <dsp:cNvGrpSpPr/>
     </dsp:nvGrpSpPr>
     <dsp:grpSpPr/>
+    <dsp:sp modelId="{3A7D9442-6D71-40D1-9AAE-A6D2F5465A90}">
+      <dsp:nvSpPr>
+        <dsp:cNvPr id="0" name=""/>
+        <dsp:cNvSpPr/>
+      </dsp:nvSpPr>
+      <dsp:spPr>
+        <a:xfrm>
+          <a:off x="2133600" y="0"/>
+          <a:ext cx="1828800" cy="1016000"/>
+        </a:xfrm>
+        <a:prstGeom prst="roundRect">
+          <a:avLst>
+            <a:gd name="adj" fmla="val 10000"/>
+          </a:avLst>
+        </a:prstGeom>
+        <a:solidFill>
+          <a:schemeClr val="accent1">
+            <a:hueOff val="0"/>
+            <a:satOff val="0"/>
+            <a:lumOff val="0"/>
+            <a:alphaOff val="0"/>
+          </a:schemeClr>
+        </a:solidFill>
+        <a:ln w="12700" cap="flat" cmpd="sng" algn="ctr">
+          <a:solidFill>
+            <a:schemeClr val="lt1">
+              <a:hueOff val="0"/>
+              <a:satOff val="0"/>
+              <a:lumOff val="0"/>
+              <a:alphaOff val="0"/>
+            </a:schemeClr>
+          </a:solidFill>
+          <a:prstDash val="solid"/>
+          <a:miter lim="800000"/>
+        </a:ln>
+        <a:effectLst/>
+      </dsp:spPr>
+      <dsp:style>
+        <a:lnRef idx="2">
+          <a:scrgbClr r="0" g="0" b="0"/>
+        </a:lnRef>
+        <a:fillRef idx="1">
+          <a:scrgbClr r="0" g="0" b="0"/>
+        </a:fillRef>
+        <a:effectRef idx="0">
+          <a:scrgbClr r="0" g="0" b="0"/>
+        </a:effectRef>
+        <a:fontRef idx="minor">
+          <a:schemeClr val="lt1"/>
+        </a:fontRef>
+      </dsp:style>
+      <dsp:txBody>
+        <a:bodyPr spcFirstLastPara="0" vert="horz" wrap="square" lIns="99060" tIns="99060" rIns="99060" bIns="99060" numCol="1" spcCol="1270" anchor="ctr" anchorCtr="0">
+          <a:noAutofit/>
+        </a:bodyPr>
+        <a:lstStyle/>
+        <a:p>
+          <a:pPr lvl="0" algn="ctr" defTabSz="1155700">
+            <a:lnSpc>
+              <a:spcPct val="90000"/>
+            </a:lnSpc>
+            <a:spcBef>
+              <a:spcPct val="0"/>
+            </a:spcBef>
+            <a:spcAft>
+              <a:spcPct val="35000"/>
+            </a:spcAft>
+          </a:pPr>
+          <a:r>
+            <a:rPr lang="en-US" sz="2600" kern="1200" dirty="0" smtClean="0"/>
+            <a:t>UI</a:t>
+          </a:r>
+          <a:endParaRPr lang="en-US" sz="2600" kern="1200" dirty="0"/>
+        </a:p>
+      </dsp:txBody>
+      <dsp:txXfrm>
+        <a:off x="2163358" y="29758"/>
+        <a:ext cx="1769284" cy="956484"/>
+      </dsp:txXfrm>
+    </dsp:sp>
+    <dsp:sp modelId="{0D23D005-0875-423D-B474-63F65D6DFC0E}">
+      <dsp:nvSpPr>
+        <dsp:cNvPr id="0" name=""/>
+        <dsp:cNvSpPr/>
+      </dsp:nvSpPr>
+      <dsp:spPr>
+        <a:xfrm rot="5400000">
+          <a:off x="2857500" y="1041399"/>
+          <a:ext cx="380999" cy="457200"/>
+        </a:xfrm>
+        <a:prstGeom prst="rightArrow">
+          <a:avLst>
+            <a:gd name="adj1" fmla="val 60000"/>
+            <a:gd name="adj2" fmla="val 50000"/>
+          </a:avLst>
+        </a:prstGeom>
+        <a:solidFill>
+          <a:schemeClr val="accent1">
+            <a:tint val="60000"/>
+            <a:hueOff val="0"/>
+            <a:satOff val="0"/>
+            <a:lumOff val="0"/>
+            <a:alphaOff val="0"/>
+          </a:schemeClr>
+        </a:solidFill>
+        <a:ln>
+          <a:noFill/>
+        </a:ln>
+        <a:effectLst/>
+      </dsp:spPr>
+      <dsp:style>
+        <a:lnRef idx="0">
+          <a:scrgbClr r="0" g="0" b="0"/>
+        </a:lnRef>
+        <a:fillRef idx="1">
+          <a:scrgbClr r="0" g="0" b="0"/>
+        </a:fillRef>
+        <a:effectRef idx="0">
+          <a:scrgbClr r="0" g="0" b="0"/>
+        </a:effectRef>
+        <a:fontRef idx="minor">
+          <a:schemeClr val="lt1"/>
+        </a:fontRef>
+      </dsp:style>
+      <dsp:txBody>
+        <a:bodyPr spcFirstLastPara="0" vert="horz" wrap="square" lIns="0" tIns="0" rIns="0" bIns="0" numCol="1" spcCol="1270" anchor="ctr" anchorCtr="0">
+          <a:noAutofit/>
+        </a:bodyPr>
+        <a:lstStyle/>
+        <a:p>
+          <a:pPr lvl="0" algn="ctr" defTabSz="844550">
+            <a:lnSpc>
+              <a:spcPct val="90000"/>
+            </a:lnSpc>
+            <a:spcBef>
+              <a:spcPct val="0"/>
+            </a:spcBef>
+            <a:spcAft>
+              <a:spcPct val="35000"/>
+            </a:spcAft>
+          </a:pPr>
+          <a:endParaRPr lang="en-US" sz="1900" kern="1200"/>
+        </a:p>
+      </dsp:txBody>
+      <dsp:txXfrm rot="-5400000">
+        <a:off x="2910840" y="1079499"/>
+        <a:ext cx="274320" cy="266699"/>
+      </dsp:txXfrm>
+    </dsp:sp>
+    <dsp:sp modelId="{233AEADD-C13F-4F7E-835B-72E82D37B660}">
+      <dsp:nvSpPr>
+        <dsp:cNvPr id="0" name=""/>
+        <dsp:cNvSpPr/>
+      </dsp:nvSpPr>
+      <dsp:spPr>
+        <a:xfrm>
+          <a:off x="2133600" y="1523999"/>
+          <a:ext cx="1828800" cy="1016000"/>
+        </a:xfrm>
+        <a:prstGeom prst="roundRect">
+          <a:avLst>
+            <a:gd name="adj" fmla="val 10000"/>
+          </a:avLst>
+        </a:prstGeom>
+        <a:solidFill>
+          <a:schemeClr val="accent1">
+            <a:hueOff val="0"/>
+            <a:satOff val="0"/>
+            <a:lumOff val="0"/>
+            <a:alphaOff val="0"/>
+          </a:schemeClr>
+        </a:solidFill>
+        <a:ln w="12700" cap="flat" cmpd="sng" algn="ctr">
+          <a:solidFill>
+            <a:schemeClr val="lt1">
+              <a:hueOff val="0"/>
+              <a:satOff val="0"/>
+              <a:lumOff val="0"/>
+              <a:alphaOff val="0"/>
+            </a:schemeClr>
+          </a:solidFill>
+          <a:prstDash val="solid"/>
+          <a:miter lim="800000"/>
+        </a:ln>
+        <a:effectLst/>
+      </dsp:spPr>
+      <dsp:style>
+        <a:lnRef idx="2">
+          <a:scrgbClr r="0" g="0" b="0"/>
+        </a:lnRef>
+        <a:fillRef idx="1">
+          <a:scrgbClr r="0" g="0" b="0"/>
+        </a:fillRef>
+        <a:effectRef idx="0">
+          <a:scrgbClr r="0" g="0" b="0"/>
+        </a:effectRef>
+        <a:fontRef idx="minor">
+          <a:schemeClr val="lt1"/>
+        </a:fontRef>
+      </dsp:style>
+      <dsp:txBody>
+        <a:bodyPr spcFirstLastPara="0" vert="horz" wrap="square" lIns="99060" tIns="99060" rIns="99060" bIns="99060" numCol="1" spcCol="1270" anchor="ctr" anchorCtr="0">
+          <a:noAutofit/>
+        </a:bodyPr>
+        <a:lstStyle/>
+        <a:p>
+          <a:pPr lvl="0" algn="ctr" defTabSz="1155700">
+            <a:lnSpc>
+              <a:spcPct val="90000"/>
+            </a:lnSpc>
+            <a:spcBef>
+              <a:spcPct val="0"/>
+            </a:spcBef>
+            <a:spcAft>
+              <a:spcPct val="35000"/>
+            </a:spcAft>
+          </a:pPr>
+          <a:r>
+            <a:rPr lang="en-US" sz="2600" kern="1200" dirty="0" smtClean="0"/>
+            <a:t>Business Logic</a:t>
+          </a:r>
+          <a:endParaRPr lang="en-US" sz="2600" kern="1200" dirty="0"/>
+        </a:p>
+      </dsp:txBody>
+      <dsp:txXfrm>
+        <a:off x="2163358" y="1553757"/>
+        <a:ext cx="1769284" cy="956484"/>
+      </dsp:txXfrm>
+    </dsp:sp>
+    <dsp:sp modelId="{59CBBF36-5299-416E-9580-101B500DC515}">
+      <dsp:nvSpPr>
+        <dsp:cNvPr id="0" name=""/>
+        <dsp:cNvSpPr/>
+      </dsp:nvSpPr>
+      <dsp:spPr>
+        <a:xfrm rot="5400000">
+          <a:off x="2857500" y="2565399"/>
+          <a:ext cx="381000" cy="457200"/>
+        </a:xfrm>
+        <a:prstGeom prst="rightArrow">
+          <a:avLst>
+            <a:gd name="adj1" fmla="val 60000"/>
+            <a:gd name="adj2" fmla="val 50000"/>
+          </a:avLst>
+        </a:prstGeom>
+        <a:solidFill>
+          <a:schemeClr val="accent1">
+            <a:tint val="60000"/>
+            <a:hueOff val="0"/>
+            <a:satOff val="0"/>
+            <a:lumOff val="0"/>
+            <a:alphaOff val="0"/>
+          </a:schemeClr>
+        </a:solidFill>
+        <a:ln>
+          <a:noFill/>
+        </a:ln>
+        <a:effectLst/>
+      </dsp:spPr>
+      <dsp:style>
+        <a:lnRef idx="0">
+          <a:scrgbClr r="0" g="0" b="0"/>
+        </a:lnRef>
+        <a:fillRef idx="1">
+          <a:scrgbClr r="0" g="0" b="0"/>
+        </a:fillRef>
+        <a:effectRef idx="0">
+          <a:scrgbClr r="0" g="0" b="0"/>
+        </a:effectRef>
+        <a:fontRef idx="minor">
+          <a:schemeClr val="lt1"/>
+        </a:fontRef>
+      </dsp:style>
+      <dsp:txBody>
+        <a:bodyPr spcFirstLastPara="0" vert="horz" wrap="square" lIns="0" tIns="0" rIns="0" bIns="0" numCol="1" spcCol="1270" anchor="ctr" anchorCtr="0">
+          <a:noAutofit/>
+        </a:bodyPr>
+        <a:lstStyle/>
+        <a:p>
+          <a:pPr lvl="0" algn="ctr" defTabSz="844550">
+            <a:lnSpc>
+              <a:spcPct val="90000"/>
+            </a:lnSpc>
+            <a:spcBef>
+              <a:spcPct val="0"/>
+            </a:spcBef>
+            <a:spcAft>
+              <a:spcPct val="35000"/>
+            </a:spcAft>
+          </a:pPr>
+          <a:endParaRPr lang="en-US" sz="1900" kern="1200"/>
+        </a:p>
+      </dsp:txBody>
+      <dsp:txXfrm rot="-5400000">
+        <a:off x="2910840" y="2603499"/>
+        <a:ext cx="274320" cy="266700"/>
+      </dsp:txXfrm>
+    </dsp:sp>
+    <dsp:sp modelId="{C8E7B3FC-65E6-41D0-862D-3BB73500C05F}">
+      <dsp:nvSpPr>
+        <dsp:cNvPr id="0" name=""/>
+        <dsp:cNvSpPr/>
+      </dsp:nvSpPr>
+      <dsp:spPr>
+        <a:xfrm>
+          <a:off x="2133600" y="3047999"/>
+          <a:ext cx="1828800" cy="1016000"/>
+        </a:xfrm>
+        <a:prstGeom prst="roundRect">
+          <a:avLst>
+            <a:gd name="adj" fmla="val 10000"/>
+          </a:avLst>
+        </a:prstGeom>
+        <a:solidFill>
+          <a:schemeClr val="accent1">
+            <a:hueOff val="0"/>
+            <a:satOff val="0"/>
+            <a:lumOff val="0"/>
+            <a:alphaOff val="0"/>
+          </a:schemeClr>
+        </a:solidFill>
+        <a:ln w="12700" cap="flat" cmpd="sng" algn="ctr">
+          <a:solidFill>
+            <a:schemeClr val="lt1">
+              <a:hueOff val="0"/>
+              <a:satOff val="0"/>
+              <a:lumOff val="0"/>
+              <a:alphaOff val="0"/>
+            </a:schemeClr>
+          </a:solidFill>
+          <a:prstDash val="solid"/>
+          <a:miter lim="800000"/>
+        </a:ln>
+        <a:effectLst/>
+      </dsp:spPr>
+      <dsp:style>
+        <a:lnRef idx="2">
+          <a:scrgbClr r="0" g="0" b="0"/>
+        </a:lnRef>
+        <a:fillRef idx="1">
+          <a:scrgbClr r="0" g="0" b="0"/>
+        </a:fillRef>
+        <a:effectRef idx="0">
+          <a:scrgbClr r="0" g="0" b="0"/>
+        </a:effectRef>
+        <a:fontRef idx="minor">
+          <a:schemeClr val="lt1"/>
+        </a:fontRef>
+      </dsp:style>
+      <dsp:txBody>
+        <a:bodyPr spcFirstLastPara="0" vert="horz" wrap="square" lIns="99060" tIns="99060" rIns="99060" bIns="99060" numCol="1" spcCol="1270" anchor="ctr" anchorCtr="0">
+          <a:noAutofit/>
+        </a:bodyPr>
+        <a:lstStyle/>
+        <a:p>
+          <a:pPr lvl="0" algn="ctr" defTabSz="1155700">
+            <a:lnSpc>
+              <a:spcPct val="90000"/>
+            </a:lnSpc>
+            <a:spcBef>
+              <a:spcPct val="0"/>
+            </a:spcBef>
+            <a:spcAft>
+              <a:spcPct val="35000"/>
+            </a:spcAft>
+          </a:pPr>
+          <a:r>
+            <a:rPr lang="en-US" sz="2600" kern="1200" dirty="0" smtClean="0"/>
+            <a:t>Data Access</a:t>
+          </a:r>
+          <a:endParaRPr lang="en-US" sz="2600" kern="1200" dirty="0"/>
+        </a:p>
+      </dsp:txBody>
+      <dsp:txXfrm>
+        <a:off x="2163358" y="3077757"/>
+        <a:ext cx="1769284" cy="956484"/>
+      </dsp:txXfrm>
+    </dsp:sp>
   </dsp:spTree>
 </dsp:drawing>
 </file>
@@ -5621,6 +5999,1651 @@
       <dsp:cNvGrpSpPr/>
     </dsp:nvGrpSpPr>
     <dsp:grpSpPr/>
+    <dsp:sp modelId="{BA6A6CE0-494D-4FCE-BF25-85ED54D9174F}">
+      <dsp:nvSpPr>
+        <dsp:cNvPr id="0" name=""/>
+        <dsp:cNvSpPr/>
+      </dsp:nvSpPr>
+      <dsp:spPr>
+        <a:xfrm>
+          <a:off x="989380" y="1811707"/>
+          <a:ext cx="1149705" cy="987223"/>
+        </a:xfrm>
+        <a:prstGeom prst="hexagon">
+          <a:avLst>
+            <a:gd name="adj" fmla="val 25000"/>
+            <a:gd name="vf" fmla="val 115470"/>
+          </a:avLst>
+        </a:prstGeom>
+        <a:solidFill>
+          <a:schemeClr val="accent1">
+            <a:hueOff val="0"/>
+            <a:satOff val="0"/>
+            <a:lumOff val="0"/>
+            <a:alphaOff val="0"/>
+          </a:schemeClr>
+        </a:solidFill>
+        <a:ln w="12700" cap="flat" cmpd="sng" algn="ctr">
+          <a:solidFill>
+            <a:schemeClr val="accent1">
+              <a:hueOff val="0"/>
+              <a:satOff val="0"/>
+              <a:lumOff val="0"/>
+              <a:alphaOff val="0"/>
+            </a:schemeClr>
+          </a:solidFill>
+          <a:prstDash val="solid"/>
+          <a:miter lim="800000"/>
+        </a:ln>
+        <a:effectLst/>
+      </dsp:spPr>
+      <dsp:style>
+        <a:lnRef idx="2">
+          <a:scrgbClr r="0" g="0" b="0"/>
+        </a:lnRef>
+        <a:fillRef idx="1">
+          <a:scrgbClr r="0" g="0" b="0"/>
+        </a:fillRef>
+        <a:effectRef idx="0">
+          <a:scrgbClr r="0" g="0" b="0"/>
+        </a:effectRef>
+        <a:fontRef idx="minor">
+          <a:schemeClr val="lt1"/>
+        </a:fontRef>
+      </dsp:style>
+      <dsp:txBody>
+        <a:bodyPr spcFirstLastPara="0" vert="horz" wrap="square" lIns="0" tIns="19050" rIns="0" bIns="19050" numCol="1" spcCol="1270" anchor="ctr" anchorCtr="0">
+          <a:noAutofit/>
+        </a:bodyPr>
+        <a:lstStyle/>
+        <a:p>
+          <a:pPr lvl="0" algn="ctr" defTabSz="666750">
+            <a:lnSpc>
+              <a:spcPct val="90000"/>
+            </a:lnSpc>
+            <a:spcBef>
+              <a:spcPct val="0"/>
+            </a:spcBef>
+            <a:spcAft>
+              <a:spcPct val="35000"/>
+            </a:spcAft>
+          </a:pPr>
+          <a:r>
+            <a:rPr lang="en-US" sz="1500" kern="1200" dirty="0" smtClean="0"/>
+            <a:t>GUIs</a:t>
+          </a:r>
+          <a:endParaRPr lang="en-US" sz="1500" kern="1200" dirty="0"/>
+        </a:p>
+      </dsp:txBody>
+      <dsp:txXfrm>
+        <a:off x="1167457" y="1964618"/>
+        <a:ext cx="793551" cy="681401"/>
+      </dsp:txXfrm>
+    </dsp:sp>
+    <dsp:sp modelId="{3C56AA2E-0A27-4280-8C8C-EAE26C2CB68D}">
+      <dsp:nvSpPr>
+        <dsp:cNvPr id="0" name=""/>
+        <dsp:cNvSpPr/>
+      </dsp:nvSpPr>
+      <dsp:spPr>
+        <a:xfrm>
+          <a:off x="1016812" y="2253036"/>
+          <a:ext cx="134112" cy="115727"/>
+        </a:xfrm>
+        <a:prstGeom prst="hexagon">
+          <a:avLst>
+            <a:gd name="adj" fmla="val 25000"/>
+            <a:gd name="vf" fmla="val 115470"/>
+          </a:avLst>
+        </a:prstGeom>
+        <a:solidFill>
+          <a:schemeClr val="lt1">
+            <a:hueOff val="0"/>
+            <a:satOff val="0"/>
+            <a:lumOff val="0"/>
+            <a:alphaOff val="0"/>
+          </a:schemeClr>
+        </a:solidFill>
+        <a:ln w="12700" cap="flat" cmpd="sng" algn="ctr">
+          <a:solidFill>
+            <a:schemeClr val="accent1">
+              <a:hueOff val="0"/>
+              <a:satOff val="0"/>
+              <a:lumOff val="0"/>
+              <a:alphaOff val="0"/>
+            </a:schemeClr>
+          </a:solidFill>
+          <a:prstDash val="solid"/>
+          <a:miter lim="800000"/>
+        </a:ln>
+        <a:effectLst/>
+      </dsp:spPr>
+      <dsp:style>
+        <a:lnRef idx="2">
+          <a:scrgbClr r="0" g="0" b="0"/>
+        </a:lnRef>
+        <a:fillRef idx="1">
+          <a:scrgbClr r="0" g="0" b="0"/>
+        </a:fillRef>
+        <a:effectRef idx="0">
+          <a:scrgbClr r="0" g="0" b="0"/>
+        </a:effectRef>
+        <a:fontRef idx="minor"/>
+      </dsp:style>
+    </dsp:sp>
+    <dsp:sp modelId="{5D129C62-9EB8-4F66-8FC2-331C8C5A35CA}">
+      <dsp:nvSpPr>
+        <dsp:cNvPr id="0" name=""/>
+        <dsp:cNvSpPr/>
+      </dsp:nvSpPr>
+      <dsp:spPr>
+        <a:xfrm>
+          <a:off x="0" y="1265813"/>
+          <a:ext cx="1149705" cy="987223"/>
+        </a:xfrm>
+        <a:prstGeom prst="hexagon">
+          <a:avLst>
+            <a:gd name="adj" fmla="val 25000"/>
+            <a:gd name="vf" fmla="val 115470"/>
+          </a:avLst>
+        </a:prstGeom>
+        <a:solidFill>
+          <a:schemeClr val="lt1">
+            <a:alpha val="90000"/>
+            <a:hueOff val="0"/>
+            <a:satOff val="0"/>
+            <a:lumOff val="0"/>
+            <a:alphaOff val="0"/>
+          </a:schemeClr>
+        </a:solidFill>
+        <a:ln w="12700" cap="flat" cmpd="sng" algn="ctr">
+          <a:solidFill>
+            <a:schemeClr val="accent1">
+              <a:hueOff val="0"/>
+              <a:satOff val="0"/>
+              <a:lumOff val="0"/>
+              <a:alphaOff val="0"/>
+            </a:schemeClr>
+          </a:solidFill>
+          <a:prstDash val="solid"/>
+          <a:miter lim="800000"/>
+        </a:ln>
+        <a:effectLst/>
+      </dsp:spPr>
+      <dsp:style>
+        <a:lnRef idx="2">
+          <a:scrgbClr r="0" g="0" b="0"/>
+        </a:lnRef>
+        <a:fillRef idx="1">
+          <a:scrgbClr r="0" g="0" b="0"/>
+        </a:fillRef>
+        <a:effectRef idx="0">
+          <a:scrgbClr r="0" g="0" b="0"/>
+        </a:effectRef>
+        <a:fontRef idx="minor"/>
+      </dsp:style>
+    </dsp:sp>
+    <dsp:sp modelId="{7156BA52-29A7-4F7B-ABA0-E7FF9F16298D}">
+      <dsp:nvSpPr>
+        <dsp:cNvPr id="0" name=""/>
+        <dsp:cNvSpPr/>
+      </dsp:nvSpPr>
+      <dsp:spPr>
+        <a:xfrm>
+          <a:off x="787603" y="2122052"/>
+          <a:ext cx="134112" cy="115727"/>
+        </a:xfrm>
+        <a:prstGeom prst="hexagon">
+          <a:avLst>
+            <a:gd name="adj" fmla="val 25000"/>
+            <a:gd name="vf" fmla="val 115470"/>
+          </a:avLst>
+        </a:prstGeom>
+        <a:solidFill>
+          <a:schemeClr val="lt1">
+            <a:hueOff val="0"/>
+            <a:satOff val="0"/>
+            <a:lumOff val="0"/>
+            <a:alphaOff val="0"/>
+          </a:schemeClr>
+        </a:solidFill>
+        <a:ln w="12700" cap="flat" cmpd="sng" algn="ctr">
+          <a:solidFill>
+            <a:schemeClr val="accent1">
+              <a:hueOff val="0"/>
+              <a:satOff val="0"/>
+              <a:lumOff val="0"/>
+              <a:alphaOff val="0"/>
+            </a:schemeClr>
+          </a:solidFill>
+          <a:prstDash val="solid"/>
+          <a:miter lim="800000"/>
+        </a:ln>
+        <a:effectLst/>
+      </dsp:spPr>
+      <dsp:style>
+        <a:lnRef idx="2">
+          <a:scrgbClr r="0" g="0" b="0"/>
+        </a:lnRef>
+        <a:fillRef idx="1">
+          <a:scrgbClr r="0" g="0" b="0"/>
+        </a:fillRef>
+        <a:effectRef idx="0">
+          <a:scrgbClr r="0" g="0" b="0"/>
+        </a:effectRef>
+        <a:fontRef idx="minor"/>
+      </dsp:style>
+    </dsp:sp>
+    <dsp:sp modelId="{00E0ECD4-357F-4B7C-BB2F-6F72EC02B996}">
+      <dsp:nvSpPr>
+        <dsp:cNvPr id="0" name=""/>
+        <dsp:cNvSpPr/>
+      </dsp:nvSpPr>
+      <dsp:spPr>
+        <a:xfrm>
+          <a:off x="1978761" y="1262836"/>
+          <a:ext cx="1149705" cy="987223"/>
+        </a:xfrm>
+        <a:prstGeom prst="hexagon">
+          <a:avLst>
+            <a:gd name="adj" fmla="val 25000"/>
+            <a:gd name="vf" fmla="val 115470"/>
+          </a:avLst>
+        </a:prstGeom>
+        <a:solidFill>
+          <a:schemeClr val="accent1">
+            <a:hueOff val="0"/>
+            <a:satOff val="0"/>
+            <a:lumOff val="0"/>
+            <a:alphaOff val="0"/>
+          </a:schemeClr>
+        </a:solidFill>
+        <a:ln w="12700" cap="flat" cmpd="sng" algn="ctr">
+          <a:solidFill>
+            <a:schemeClr val="accent1">
+              <a:hueOff val="0"/>
+              <a:satOff val="0"/>
+              <a:lumOff val="0"/>
+              <a:alphaOff val="0"/>
+            </a:schemeClr>
+          </a:solidFill>
+          <a:prstDash val="solid"/>
+          <a:miter lim="800000"/>
+        </a:ln>
+        <a:effectLst/>
+      </dsp:spPr>
+      <dsp:style>
+        <a:lnRef idx="2">
+          <a:scrgbClr r="0" g="0" b="0"/>
+        </a:lnRef>
+        <a:fillRef idx="1">
+          <a:scrgbClr r="0" g="0" b="0"/>
+        </a:fillRef>
+        <a:effectRef idx="0">
+          <a:scrgbClr r="0" g="0" b="0"/>
+        </a:effectRef>
+        <a:fontRef idx="minor">
+          <a:schemeClr val="lt1"/>
+        </a:fontRef>
+      </dsp:style>
+      <dsp:txBody>
+        <a:bodyPr spcFirstLastPara="0" vert="horz" wrap="square" lIns="0" tIns="19050" rIns="0" bIns="19050" numCol="1" spcCol="1270" anchor="ctr" anchorCtr="0">
+          <a:noAutofit/>
+        </a:bodyPr>
+        <a:lstStyle/>
+        <a:p>
+          <a:pPr lvl="0" algn="ctr" defTabSz="666750">
+            <a:lnSpc>
+              <a:spcPct val="90000"/>
+            </a:lnSpc>
+            <a:spcBef>
+              <a:spcPct val="0"/>
+            </a:spcBef>
+            <a:spcAft>
+              <a:spcPct val="35000"/>
+            </a:spcAft>
+          </a:pPr>
+          <a:r>
+            <a:rPr lang="en-US" sz="1500" kern="1200" dirty="0" smtClean="0"/>
+            <a:t>View Models</a:t>
+          </a:r>
+          <a:endParaRPr lang="en-US" sz="1500" kern="1200" dirty="0"/>
+        </a:p>
+      </dsp:txBody>
+      <dsp:txXfrm>
+        <a:off x="2156838" y="1415747"/>
+        <a:ext cx="793551" cy="681401"/>
+      </dsp:txXfrm>
+    </dsp:sp>
+    <dsp:sp modelId="{AF260883-C4FD-4DFA-ABE8-8432B9DE9338}">
+      <dsp:nvSpPr>
+        <dsp:cNvPr id="0" name=""/>
+        <dsp:cNvSpPr/>
+      </dsp:nvSpPr>
+      <dsp:spPr>
+        <a:xfrm>
+          <a:off x="2770022" y="2116842"/>
+          <a:ext cx="134112" cy="115727"/>
+        </a:xfrm>
+        <a:prstGeom prst="hexagon">
+          <a:avLst>
+            <a:gd name="adj" fmla="val 25000"/>
+            <a:gd name="vf" fmla="val 115470"/>
+          </a:avLst>
+        </a:prstGeom>
+        <a:solidFill>
+          <a:schemeClr val="lt1">
+            <a:hueOff val="0"/>
+            <a:satOff val="0"/>
+            <a:lumOff val="0"/>
+            <a:alphaOff val="0"/>
+          </a:schemeClr>
+        </a:solidFill>
+        <a:ln w="12700" cap="flat" cmpd="sng" algn="ctr">
+          <a:solidFill>
+            <a:schemeClr val="accent1">
+              <a:hueOff val="0"/>
+              <a:satOff val="0"/>
+              <a:lumOff val="0"/>
+              <a:alphaOff val="0"/>
+            </a:schemeClr>
+          </a:solidFill>
+          <a:prstDash val="solid"/>
+          <a:miter lim="800000"/>
+        </a:ln>
+        <a:effectLst/>
+      </dsp:spPr>
+      <dsp:style>
+        <a:lnRef idx="2">
+          <a:scrgbClr r="0" g="0" b="0"/>
+        </a:lnRef>
+        <a:fillRef idx="1">
+          <a:scrgbClr r="0" g="0" b="0"/>
+        </a:fillRef>
+        <a:effectRef idx="0">
+          <a:scrgbClr r="0" g="0" b="0"/>
+        </a:effectRef>
+        <a:fontRef idx="minor"/>
+      </dsp:style>
+    </dsp:sp>
+    <dsp:sp modelId="{B615AFB0-C5EA-4143-BA08-B6830BA64186}">
+      <dsp:nvSpPr>
+        <dsp:cNvPr id="0" name=""/>
+        <dsp:cNvSpPr/>
+      </dsp:nvSpPr>
+      <dsp:spPr>
+        <a:xfrm>
+          <a:off x="2967532" y="1809474"/>
+          <a:ext cx="1149705" cy="987223"/>
+        </a:xfrm>
+        <a:prstGeom prst="hexagon">
+          <a:avLst>
+            <a:gd name="adj" fmla="val 25000"/>
+            <a:gd name="vf" fmla="val 115470"/>
+          </a:avLst>
+        </a:prstGeom>
+        <a:solidFill>
+          <a:schemeClr val="lt1">
+            <a:alpha val="90000"/>
+            <a:hueOff val="0"/>
+            <a:satOff val="0"/>
+            <a:lumOff val="0"/>
+            <a:alphaOff val="0"/>
+          </a:schemeClr>
+        </a:solidFill>
+        <a:ln w="12700" cap="flat" cmpd="sng" algn="ctr">
+          <a:solidFill>
+            <a:schemeClr val="accent1">
+              <a:hueOff val="0"/>
+              <a:satOff val="0"/>
+              <a:lumOff val="0"/>
+              <a:alphaOff val="0"/>
+            </a:schemeClr>
+          </a:solidFill>
+          <a:prstDash val="solid"/>
+          <a:miter lim="800000"/>
+        </a:ln>
+        <a:effectLst/>
+      </dsp:spPr>
+      <dsp:style>
+        <a:lnRef idx="2">
+          <a:scrgbClr r="0" g="0" b="0"/>
+        </a:lnRef>
+        <a:fillRef idx="1">
+          <a:scrgbClr r="0" g="0" b="0"/>
+        </a:fillRef>
+        <a:effectRef idx="0">
+          <a:scrgbClr r="0" g="0" b="0"/>
+        </a:effectRef>
+        <a:fontRef idx="minor"/>
+      </dsp:style>
+    </dsp:sp>
+    <dsp:sp modelId="{3E01CB5D-B0B9-4915-A2C9-D38BD9F999E6}">
+      <dsp:nvSpPr>
+        <dsp:cNvPr id="0" name=""/>
+        <dsp:cNvSpPr/>
+      </dsp:nvSpPr>
+      <dsp:spPr>
+        <a:xfrm>
+          <a:off x="2995574" y="2248943"/>
+          <a:ext cx="134112" cy="115727"/>
+        </a:xfrm>
+        <a:prstGeom prst="hexagon">
+          <a:avLst>
+            <a:gd name="adj" fmla="val 25000"/>
+            <a:gd name="vf" fmla="val 115470"/>
+          </a:avLst>
+        </a:prstGeom>
+        <a:solidFill>
+          <a:schemeClr val="lt1">
+            <a:hueOff val="0"/>
+            <a:satOff val="0"/>
+            <a:lumOff val="0"/>
+            <a:alphaOff val="0"/>
+          </a:schemeClr>
+        </a:solidFill>
+        <a:ln w="12700" cap="flat" cmpd="sng" algn="ctr">
+          <a:solidFill>
+            <a:schemeClr val="accent1">
+              <a:hueOff val="0"/>
+              <a:satOff val="0"/>
+              <a:lumOff val="0"/>
+              <a:alphaOff val="0"/>
+            </a:schemeClr>
+          </a:solidFill>
+          <a:prstDash val="solid"/>
+          <a:miter lim="800000"/>
+        </a:ln>
+        <a:effectLst/>
+      </dsp:spPr>
+      <dsp:style>
+        <a:lnRef idx="2">
+          <a:scrgbClr r="0" g="0" b="0"/>
+        </a:lnRef>
+        <a:fillRef idx="1">
+          <a:scrgbClr r="0" g="0" b="0"/>
+        </a:fillRef>
+        <a:effectRef idx="0">
+          <a:scrgbClr r="0" g="0" b="0"/>
+        </a:effectRef>
+        <a:fontRef idx="minor"/>
+      </dsp:style>
+    </dsp:sp>
+    <dsp:sp modelId="{F0368487-8B6A-424E-8487-710AD6D626B5}">
+      <dsp:nvSpPr>
+        <dsp:cNvPr id="0" name=""/>
+        <dsp:cNvSpPr/>
+      </dsp:nvSpPr>
+      <dsp:spPr>
+        <a:xfrm>
+          <a:off x="989380" y="720292"/>
+          <a:ext cx="1149705" cy="987223"/>
+        </a:xfrm>
+        <a:prstGeom prst="hexagon">
+          <a:avLst>
+            <a:gd name="adj" fmla="val 25000"/>
+            <a:gd name="vf" fmla="val 115470"/>
+          </a:avLst>
+        </a:prstGeom>
+        <a:solidFill>
+          <a:schemeClr val="accent1">
+            <a:hueOff val="0"/>
+            <a:satOff val="0"/>
+            <a:lumOff val="0"/>
+            <a:alphaOff val="0"/>
+          </a:schemeClr>
+        </a:solidFill>
+        <a:ln w="12700" cap="flat" cmpd="sng" algn="ctr">
+          <a:solidFill>
+            <a:schemeClr val="accent1">
+              <a:hueOff val="0"/>
+              <a:satOff val="0"/>
+              <a:lumOff val="0"/>
+              <a:alphaOff val="0"/>
+            </a:schemeClr>
+          </a:solidFill>
+          <a:prstDash val="solid"/>
+          <a:miter lim="800000"/>
+        </a:ln>
+        <a:effectLst/>
+      </dsp:spPr>
+      <dsp:style>
+        <a:lnRef idx="2">
+          <a:scrgbClr r="0" g="0" b="0"/>
+        </a:lnRef>
+        <a:fillRef idx="1">
+          <a:scrgbClr r="0" g="0" b="0"/>
+        </a:fillRef>
+        <a:effectRef idx="0">
+          <a:scrgbClr r="0" g="0" b="0"/>
+        </a:effectRef>
+        <a:fontRef idx="minor">
+          <a:schemeClr val="lt1"/>
+        </a:fontRef>
+      </dsp:style>
+      <dsp:txBody>
+        <a:bodyPr spcFirstLastPara="0" vert="horz" wrap="square" lIns="0" tIns="19050" rIns="0" bIns="19050" numCol="1" spcCol="1270" anchor="ctr" anchorCtr="0">
+          <a:noAutofit/>
+        </a:bodyPr>
+        <a:lstStyle/>
+        <a:p>
+          <a:pPr lvl="0" algn="ctr" defTabSz="666750">
+            <a:lnSpc>
+              <a:spcPct val="90000"/>
+            </a:lnSpc>
+            <a:spcBef>
+              <a:spcPct val="0"/>
+            </a:spcBef>
+            <a:spcAft>
+              <a:spcPct val="35000"/>
+            </a:spcAft>
+          </a:pPr>
+          <a:r>
+            <a:rPr lang="en-US" sz="1500" kern="1200" dirty="0" smtClean="0"/>
+            <a:t>Models (non-data bases)</a:t>
+          </a:r>
+          <a:endParaRPr lang="en-US" sz="1500" kern="1200" dirty="0"/>
+        </a:p>
+      </dsp:txBody>
+      <dsp:txXfrm>
+        <a:off x="1167457" y="873203"/>
+        <a:ext cx="793551" cy="681401"/>
+      </dsp:txXfrm>
+    </dsp:sp>
+    <dsp:sp modelId="{3E544282-DA97-47DB-884A-4F522688DC4E}">
+      <dsp:nvSpPr>
+        <dsp:cNvPr id="0" name=""/>
+        <dsp:cNvSpPr/>
+      </dsp:nvSpPr>
+      <dsp:spPr>
+        <a:xfrm>
+          <a:off x="1772107" y="733688"/>
+          <a:ext cx="134112" cy="115727"/>
+        </a:xfrm>
+        <a:prstGeom prst="hexagon">
+          <a:avLst>
+            <a:gd name="adj" fmla="val 25000"/>
+            <a:gd name="vf" fmla="val 115470"/>
+          </a:avLst>
+        </a:prstGeom>
+        <a:solidFill>
+          <a:schemeClr val="lt1">
+            <a:hueOff val="0"/>
+            <a:satOff val="0"/>
+            <a:lumOff val="0"/>
+            <a:alphaOff val="0"/>
+          </a:schemeClr>
+        </a:solidFill>
+        <a:ln w="12700" cap="flat" cmpd="sng" algn="ctr">
+          <a:solidFill>
+            <a:schemeClr val="accent1">
+              <a:hueOff val="0"/>
+              <a:satOff val="0"/>
+              <a:lumOff val="0"/>
+              <a:alphaOff val="0"/>
+            </a:schemeClr>
+          </a:solidFill>
+          <a:prstDash val="solid"/>
+          <a:miter lim="800000"/>
+        </a:ln>
+        <a:effectLst/>
+      </dsp:spPr>
+      <dsp:style>
+        <a:lnRef idx="2">
+          <a:scrgbClr r="0" g="0" b="0"/>
+        </a:lnRef>
+        <a:fillRef idx="1">
+          <a:scrgbClr r="0" g="0" b="0"/>
+        </a:fillRef>
+        <a:effectRef idx="0">
+          <a:scrgbClr r="0" g="0" b="0"/>
+        </a:effectRef>
+        <a:fontRef idx="minor"/>
+      </dsp:style>
+    </dsp:sp>
+    <dsp:sp modelId="{817AE921-8860-4252-AFEA-794451FF2C19}">
+      <dsp:nvSpPr>
+        <dsp:cNvPr id="0" name=""/>
+        <dsp:cNvSpPr/>
+      </dsp:nvSpPr>
+      <dsp:spPr>
+        <a:xfrm>
+          <a:off x="1978761" y="171421"/>
+          <a:ext cx="1149705" cy="987223"/>
+        </a:xfrm>
+        <a:prstGeom prst="hexagon">
+          <a:avLst>
+            <a:gd name="adj" fmla="val 25000"/>
+            <a:gd name="vf" fmla="val 115470"/>
+          </a:avLst>
+        </a:prstGeom>
+        <a:solidFill>
+          <a:schemeClr val="lt1">
+            <a:alpha val="90000"/>
+            <a:hueOff val="0"/>
+            <a:satOff val="0"/>
+            <a:lumOff val="0"/>
+            <a:alphaOff val="0"/>
+          </a:schemeClr>
+        </a:solidFill>
+        <a:ln w="12700" cap="flat" cmpd="sng" algn="ctr">
+          <a:solidFill>
+            <a:schemeClr val="accent1">
+              <a:hueOff val="0"/>
+              <a:satOff val="0"/>
+              <a:lumOff val="0"/>
+              <a:alphaOff val="0"/>
+            </a:schemeClr>
+          </a:solidFill>
+          <a:prstDash val="solid"/>
+          <a:miter lim="800000"/>
+        </a:ln>
+        <a:effectLst/>
+      </dsp:spPr>
+      <dsp:style>
+        <a:lnRef idx="2">
+          <a:scrgbClr r="0" g="0" b="0"/>
+        </a:lnRef>
+        <a:fillRef idx="1">
+          <a:scrgbClr r="0" g="0" b="0"/>
+        </a:fillRef>
+        <a:effectRef idx="0">
+          <a:scrgbClr r="0" g="0" b="0"/>
+        </a:effectRef>
+        <a:fontRef idx="minor"/>
+      </dsp:style>
+    </dsp:sp>
+    <dsp:sp modelId="{0FE1CE98-B663-4B2B-9686-2A8710285BBF}">
+      <dsp:nvSpPr>
+        <dsp:cNvPr id="0" name=""/>
+        <dsp:cNvSpPr/>
+      </dsp:nvSpPr>
+      <dsp:spPr>
+        <a:xfrm>
+          <a:off x="2011070" y="608657"/>
+          <a:ext cx="134112" cy="115727"/>
+        </a:xfrm>
+        <a:prstGeom prst="hexagon">
+          <a:avLst>
+            <a:gd name="adj" fmla="val 25000"/>
+            <a:gd name="vf" fmla="val 115470"/>
+          </a:avLst>
+        </a:prstGeom>
+        <a:solidFill>
+          <a:schemeClr val="lt1">
+            <a:hueOff val="0"/>
+            <a:satOff val="0"/>
+            <a:lumOff val="0"/>
+            <a:alphaOff val="0"/>
+          </a:schemeClr>
+        </a:solidFill>
+        <a:ln w="12700" cap="flat" cmpd="sng" algn="ctr">
+          <a:solidFill>
+            <a:schemeClr val="accent1">
+              <a:hueOff val="0"/>
+              <a:satOff val="0"/>
+              <a:lumOff val="0"/>
+              <a:alphaOff val="0"/>
+            </a:schemeClr>
+          </a:solidFill>
+          <a:prstDash val="solid"/>
+          <a:miter lim="800000"/>
+        </a:ln>
+        <a:effectLst/>
+      </dsp:spPr>
+      <dsp:style>
+        <a:lnRef idx="2">
+          <a:scrgbClr r="0" g="0" b="0"/>
+        </a:lnRef>
+        <a:fillRef idx="1">
+          <a:scrgbClr r="0" g="0" b="0"/>
+        </a:fillRef>
+        <a:effectRef idx="0">
+          <a:scrgbClr r="0" g="0" b="0"/>
+        </a:effectRef>
+        <a:fontRef idx="minor"/>
+      </dsp:style>
+    </dsp:sp>
+    <dsp:sp modelId="{BDFC9C28-1CDA-4F51-9FA2-279AC59D98B2}">
+      <dsp:nvSpPr>
+        <dsp:cNvPr id="0" name=""/>
+        <dsp:cNvSpPr/>
+      </dsp:nvSpPr>
+      <dsp:spPr>
+        <a:xfrm>
+          <a:off x="2967532" y="718059"/>
+          <a:ext cx="1149705" cy="987223"/>
+        </a:xfrm>
+        <a:prstGeom prst="hexagon">
+          <a:avLst>
+            <a:gd name="adj" fmla="val 25000"/>
+            <a:gd name="vf" fmla="val 115470"/>
+          </a:avLst>
+        </a:prstGeom>
+        <a:solidFill>
+          <a:schemeClr val="accent1">
+            <a:hueOff val="0"/>
+            <a:satOff val="0"/>
+            <a:lumOff val="0"/>
+            <a:alphaOff val="0"/>
+          </a:schemeClr>
+        </a:solidFill>
+        <a:ln w="12700" cap="flat" cmpd="sng" algn="ctr">
+          <a:solidFill>
+            <a:schemeClr val="accent1">
+              <a:hueOff val="0"/>
+              <a:satOff val="0"/>
+              <a:lumOff val="0"/>
+              <a:alphaOff val="0"/>
+            </a:schemeClr>
+          </a:solidFill>
+          <a:prstDash val="solid"/>
+          <a:miter lim="800000"/>
+        </a:ln>
+        <a:effectLst/>
+      </dsp:spPr>
+      <dsp:style>
+        <a:lnRef idx="2">
+          <a:scrgbClr r="0" g="0" b="0"/>
+        </a:lnRef>
+        <a:fillRef idx="1">
+          <a:scrgbClr r="0" g="0" b="0"/>
+        </a:fillRef>
+        <a:effectRef idx="0">
+          <a:scrgbClr r="0" g="0" b="0"/>
+        </a:effectRef>
+        <a:fontRef idx="minor">
+          <a:schemeClr val="lt1"/>
+        </a:fontRef>
+      </dsp:style>
+      <dsp:txBody>
+        <a:bodyPr spcFirstLastPara="0" vert="horz" wrap="square" lIns="0" tIns="19050" rIns="0" bIns="19050" numCol="1" spcCol="1270" anchor="ctr" anchorCtr="0">
+          <a:noAutofit/>
+        </a:bodyPr>
+        <a:lstStyle/>
+        <a:p>
+          <a:pPr lvl="0" algn="ctr" defTabSz="666750">
+            <a:lnSpc>
+              <a:spcPct val="90000"/>
+            </a:lnSpc>
+            <a:spcBef>
+              <a:spcPct val="0"/>
+            </a:spcBef>
+            <a:spcAft>
+              <a:spcPct val="35000"/>
+            </a:spcAft>
+          </a:pPr>
+          <a:r>
+            <a:rPr lang="en-US" sz="1500" kern="1200" dirty="0" smtClean="0"/>
+            <a:t>Data Model 1</a:t>
+          </a:r>
+          <a:endParaRPr lang="en-US" sz="1500" kern="1200" dirty="0"/>
+        </a:p>
+      </dsp:txBody>
+      <dsp:txXfrm>
+        <a:off x="3145609" y="870970"/>
+        <a:ext cx="793551" cy="681401"/>
+      </dsp:txXfrm>
+    </dsp:sp>
+    <dsp:sp modelId="{5074C912-3AEE-40CC-A5E1-3412276C85B4}">
+      <dsp:nvSpPr>
+        <dsp:cNvPr id="0" name=""/>
+        <dsp:cNvSpPr/>
+      </dsp:nvSpPr>
+      <dsp:spPr>
+        <a:xfrm>
+          <a:off x="3962400" y="1155667"/>
+          <a:ext cx="134112" cy="115727"/>
+        </a:xfrm>
+        <a:prstGeom prst="hexagon">
+          <a:avLst>
+            <a:gd name="adj" fmla="val 25000"/>
+            <a:gd name="vf" fmla="val 115470"/>
+          </a:avLst>
+        </a:prstGeom>
+        <a:solidFill>
+          <a:schemeClr val="lt1">
+            <a:hueOff val="0"/>
+            <a:satOff val="0"/>
+            <a:lumOff val="0"/>
+            <a:alphaOff val="0"/>
+          </a:schemeClr>
+        </a:solidFill>
+        <a:ln w="12700" cap="flat" cmpd="sng" algn="ctr">
+          <a:solidFill>
+            <a:schemeClr val="accent1">
+              <a:hueOff val="0"/>
+              <a:satOff val="0"/>
+              <a:lumOff val="0"/>
+              <a:alphaOff val="0"/>
+            </a:schemeClr>
+          </a:solidFill>
+          <a:prstDash val="solid"/>
+          <a:miter lim="800000"/>
+        </a:ln>
+        <a:effectLst/>
+      </dsp:spPr>
+      <dsp:style>
+        <a:lnRef idx="2">
+          <a:scrgbClr r="0" g="0" b="0"/>
+        </a:lnRef>
+        <a:fillRef idx="1">
+          <a:scrgbClr r="0" g="0" b="0"/>
+        </a:fillRef>
+        <a:effectRef idx="0">
+          <a:scrgbClr r="0" g="0" b="0"/>
+        </a:effectRef>
+        <a:fontRef idx="minor"/>
+      </dsp:style>
+    </dsp:sp>
+    <dsp:sp modelId="{937D689B-6518-42A9-9DEC-4481A696981A}">
+      <dsp:nvSpPr>
+        <dsp:cNvPr id="0" name=""/>
+        <dsp:cNvSpPr/>
+      </dsp:nvSpPr>
+      <dsp:spPr>
+        <a:xfrm>
+          <a:off x="3956913" y="1273256"/>
+          <a:ext cx="1149705" cy="987223"/>
+        </a:xfrm>
+        <a:prstGeom prst="hexagon">
+          <a:avLst>
+            <a:gd name="adj" fmla="val 25000"/>
+            <a:gd name="vf" fmla="val 115470"/>
+          </a:avLst>
+        </a:prstGeom>
+        <a:solidFill>
+          <a:schemeClr val="lt1">
+            <a:alpha val="90000"/>
+            <a:hueOff val="0"/>
+            <a:satOff val="0"/>
+            <a:lumOff val="0"/>
+            <a:alphaOff val="0"/>
+          </a:schemeClr>
+        </a:solidFill>
+        <a:ln w="12700" cap="flat" cmpd="sng" algn="ctr">
+          <a:solidFill>
+            <a:schemeClr val="accent1">
+              <a:hueOff val="0"/>
+              <a:satOff val="0"/>
+              <a:lumOff val="0"/>
+              <a:alphaOff val="0"/>
+            </a:schemeClr>
+          </a:solidFill>
+          <a:prstDash val="solid"/>
+          <a:miter lim="800000"/>
+        </a:ln>
+        <a:effectLst/>
+      </dsp:spPr>
+      <dsp:style>
+        <a:lnRef idx="2">
+          <a:scrgbClr r="0" g="0" b="0"/>
+        </a:lnRef>
+        <a:fillRef idx="1">
+          <a:scrgbClr r="0" g="0" b="0"/>
+        </a:fillRef>
+        <a:effectRef idx="0">
+          <a:scrgbClr r="0" g="0" b="0"/>
+        </a:effectRef>
+        <a:fontRef idx="minor"/>
+      </dsp:style>
+    </dsp:sp>
+    <dsp:sp modelId="{7F13C035-0858-409A-8953-E41C7E963F18}">
+      <dsp:nvSpPr>
+        <dsp:cNvPr id="0" name=""/>
+        <dsp:cNvSpPr/>
+      </dsp:nvSpPr>
+      <dsp:spPr>
+        <a:xfrm>
+          <a:off x="4181246" y="1290745"/>
+          <a:ext cx="134112" cy="115727"/>
+        </a:xfrm>
+        <a:prstGeom prst="hexagon">
+          <a:avLst>
+            <a:gd name="adj" fmla="val 25000"/>
+            <a:gd name="vf" fmla="val 115470"/>
+          </a:avLst>
+        </a:prstGeom>
+        <a:solidFill>
+          <a:schemeClr val="lt1">
+            <a:hueOff val="0"/>
+            <a:satOff val="0"/>
+            <a:lumOff val="0"/>
+            <a:alphaOff val="0"/>
+          </a:schemeClr>
+        </a:solidFill>
+        <a:ln w="12700" cap="flat" cmpd="sng" algn="ctr">
+          <a:solidFill>
+            <a:schemeClr val="accent1">
+              <a:hueOff val="0"/>
+              <a:satOff val="0"/>
+              <a:lumOff val="0"/>
+              <a:alphaOff val="0"/>
+            </a:schemeClr>
+          </a:solidFill>
+          <a:prstDash val="solid"/>
+          <a:miter lim="800000"/>
+        </a:ln>
+        <a:effectLst/>
+      </dsp:spPr>
+      <dsp:style>
+        <a:lnRef idx="2">
+          <a:scrgbClr r="0" g="0" b="0"/>
+        </a:lnRef>
+        <a:fillRef idx="1">
+          <a:scrgbClr r="0" g="0" b="0"/>
+        </a:fillRef>
+        <a:effectRef idx="0">
+          <a:scrgbClr r="0" g="0" b="0"/>
+        </a:effectRef>
+        <a:fontRef idx="minor"/>
+      </dsp:style>
+    </dsp:sp>
+    <dsp:sp modelId="{EA26764B-2A8A-4B36-B909-6FC586E3E988}">
+      <dsp:nvSpPr>
+        <dsp:cNvPr id="0" name=""/>
+        <dsp:cNvSpPr/>
+      </dsp:nvSpPr>
+      <dsp:spPr>
+        <a:xfrm>
+          <a:off x="3956913" y="181840"/>
+          <a:ext cx="1149705" cy="987223"/>
+        </a:xfrm>
+        <a:prstGeom prst="hexagon">
+          <a:avLst>
+            <a:gd name="adj" fmla="val 25000"/>
+            <a:gd name="vf" fmla="val 115470"/>
+          </a:avLst>
+        </a:prstGeom>
+        <a:solidFill>
+          <a:schemeClr val="accent1">
+            <a:hueOff val="0"/>
+            <a:satOff val="0"/>
+            <a:lumOff val="0"/>
+            <a:alphaOff val="0"/>
+          </a:schemeClr>
+        </a:solidFill>
+        <a:ln w="12700" cap="flat" cmpd="sng" algn="ctr">
+          <a:solidFill>
+            <a:schemeClr val="accent1">
+              <a:hueOff val="0"/>
+              <a:satOff val="0"/>
+              <a:lumOff val="0"/>
+              <a:alphaOff val="0"/>
+            </a:schemeClr>
+          </a:solidFill>
+          <a:prstDash val="solid"/>
+          <a:miter lim="800000"/>
+        </a:ln>
+        <a:effectLst/>
+      </dsp:spPr>
+      <dsp:style>
+        <a:lnRef idx="2">
+          <a:scrgbClr r="0" g="0" b="0"/>
+        </a:lnRef>
+        <a:fillRef idx="1">
+          <a:scrgbClr r="0" g="0" b="0"/>
+        </a:fillRef>
+        <a:effectRef idx="0">
+          <a:scrgbClr r="0" g="0" b="0"/>
+        </a:effectRef>
+        <a:fontRef idx="minor">
+          <a:schemeClr val="lt1"/>
+        </a:fontRef>
+      </dsp:style>
+      <dsp:txBody>
+        <a:bodyPr spcFirstLastPara="0" vert="horz" wrap="square" lIns="0" tIns="19050" rIns="0" bIns="19050" numCol="1" spcCol="1270" anchor="ctr" anchorCtr="0">
+          <a:noAutofit/>
+        </a:bodyPr>
+        <a:lstStyle/>
+        <a:p>
+          <a:pPr lvl="0" algn="ctr" defTabSz="666750">
+            <a:lnSpc>
+              <a:spcPct val="90000"/>
+            </a:lnSpc>
+            <a:spcBef>
+              <a:spcPct val="0"/>
+            </a:spcBef>
+            <a:spcAft>
+              <a:spcPct val="35000"/>
+            </a:spcAft>
+          </a:pPr>
+          <a:r>
+            <a:rPr lang="en-US" sz="1500" kern="1200" dirty="0" smtClean="0"/>
+            <a:t>Data Model 2</a:t>
+          </a:r>
+          <a:endParaRPr lang="en-US" sz="1500" kern="1200" dirty="0"/>
+        </a:p>
+      </dsp:txBody>
+      <dsp:txXfrm>
+        <a:off x="4134990" y="334751"/>
+        <a:ext cx="793551" cy="681401"/>
+      </dsp:txXfrm>
+    </dsp:sp>
+    <dsp:sp modelId="{B9888098-0A73-4209-9172-74B1F84F88D7}">
+      <dsp:nvSpPr>
+        <dsp:cNvPr id="0" name=""/>
+        <dsp:cNvSpPr/>
+      </dsp:nvSpPr>
+      <dsp:spPr>
+        <a:xfrm>
+          <a:off x="4951780" y="624286"/>
+          <a:ext cx="134112" cy="115727"/>
+        </a:xfrm>
+        <a:prstGeom prst="hexagon">
+          <a:avLst>
+            <a:gd name="adj" fmla="val 25000"/>
+            <a:gd name="vf" fmla="val 115470"/>
+          </a:avLst>
+        </a:prstGeom>
+        <a:solidFill>
+          <a:schemeClr val="lt1">
+            <a:hueOff val="0"/>
+            <a:satOff val="0"/>
+            <a:lumOff val="0"/>
+            <a:alphaOff val="0"/>
+          </a:schemeClr>
+        </a:solidFill>
+        <a:ln w="12700" cap="flat" cmpd="sng" algn="ctr">
+          <a:solidFill>
+            <a:schemeClr val="accent1">
+              <a:hueOff val="0"/>
+              <a:satOff val="0"/>
+              <a:lumOff val="0"/>
+              <a:alphaOff val="0"/>
+            </a:schemeClr>
+          </a:solidFill>
+          <a:prstDash val="solid"/>
+          <a:miter lim="800000"/>
+        </a:ln>
+        <a:effectLst/>
+      </dsp:spPr>
+      <dsp:style>
+        <a:lnRef idx="2">
+          <a:scrgbClr r="0" g="0" b="0"/>
+        </a:lnRef>
+        <a:fillRef idx="1">
+          <a:scrgbClr r="0" g="0" b="0"/>
+        </a:fillRef>
+        <a:effectRef idx="0">
+          <a:scrgbClr r="0" g="0" b="0"/>
+        </a:effectRef>
+        <a:fontRef idx="minor"/>
+      </dsp:style>
+    </dsp:sp>
+    <dsp:sp modelId="{655CC323-10AD-4736-8149-47E3AA9A40C9}">
+      <dsp:nvSpPr>
+        <dsp:cNvPr id="0" name=""/>
+        <dsp:cNvSpPr/>
+      </dsp:nvSpPr>
+      <dsp:spPr>
+        <a:xfrm>
+          <a:off x="4946294" y="732571"/>
+          <a:ext cx="1149705" cy="987223"/>
+        </a:xfrm>
+        <a:prstGeom prst="hexagon">
+          <a:avLst>
+            <a:gd name="adj" fmla="val 25000"/>
+            <a:gd name="vf" fmla="val 115470"/>
+          </a:avLst>
+        </a:prstGeom>
+        <a:solidFill>
+          <a:schemeClr val="lt1">
+            <a:alpha val="90000"/>
+            <a:hueOff val="0"/>
+            <a:satOff val="0"/>
+            <a:lumOff val="0"/>
+            <a:alphaOff val="0"/>
+          </a:schemeClr>
+        </a:solidFill>
+        <a:ln w="12700" cap="flat" cmpd="sng" algn="ctr">
+          <a:solidFill>
+            <a:schemeClr val="accent1">
+              <a:hueOff val="0"/>
+              <a:satOff val="0"/>
+              <a:lumOff val="0"/>
+              <a:alphaOff val="0"/>
+            </a:schemeClr>
+          </a:solidFill>
+          <a:prstDash val="solid"/>
+          <a:miter lim="800000"/>
+        </a:ln>
+        <a:effectLst/>
+      </dsp:spPr>
+      <dsp:style>
+        <a:lnRef idx="2">
+          <a:scrgbClr r="0" g="0" b="0"/>
+        </a:lnRef>
+        <a:fillRef idx="1">
+          <a:scrgbClr r="0" g="0" b="0"/>
+        </a:fillRef>
+        <a:effectRef idx="0">
+          <a:scrgbClr r="0" g="0" b="0"/>
+        </a:effectRef>
+        <a:fontRef idx="minor"/>
+      </dsp:style>
+    </dsp:sp>
+    <dsp:sp modelId="{F3E0E1B3-5489-4954-8B30-D8CE7967043D}">
+      <dsp:nvSpPr>
+        <dsp:cNvPr id="0" name=""/>
+        <dsp:cNvSpPr/>
+      </dsp:nvSpPr>
+      <dsp:spPr>
+        <a:xfrm>
+          <a:off x="5175504" y="754526"/>
+          <a:ext cx="134112" cy="115727"/>
+        </a:xfrm>
+        <a:prstGeom prst="hexagon">
+          <a:avLst>
+            <a:gd name="adj" fmla="val 25000"/>
+            <a:gd name="vf" fmla="val 115470"/>
+          </a:avLst>
+        </a:prstGeom>
+        <a:solidFill>
+          <a:schemeClr val="lt1">
+            <a:hueOff val="0"/>
+            <a:satOff val="0"/>
+            <a:lumOff val="0"/>
+            <a:alphaOff val="0"/>
+          </a:schemeClr>
+        </a:solidFill>
+        <a:ln w="12700" cap="flat" cmpd="sng" algn="ctr">
+          <a:solidFill>
+            <a:schemeClr val="accent1">
+              <a:hueOff val="0"/>
+              <a:satOff val="0"/>
+              <a:lumOff val="0"/>
+              <a:alphaOff val="0"/>
+            </a:schemeClr>
+          </a:solidFill>
+          <a:prstDash val="solid"/>
+          <a:miter lim="800000"/>
+        </a:ln>
+        <a:effectLst/>
+      </dsp:spPr>
+      <dsp:style>
+        <a:lnRef idx="2">
+          <a:scrgbClr r="0" g="0" b="0"/>
+        </a:lnRef>
+        <a:fillRef idx="1">
+          <a:scrgbClr r="0" g="0" b="0"/>
+        </a:fillRef>
+        <a:effectRef idx="0">
+          <a:scrgbClr r="0" g="0" b="0"/>
+        </a:effectRef>
+        <a:fontRef idx="minor"/>
+      </dsp:style>
+    </dsp:sp>
+    <dsp:sp modelId="{ACD018CB-8A40-4788-9215-9C1CDCD4A25F}">
+      <dsp:nvSpPr>
+        <dsp:cNvPr id="0" name=""/>
+        <dsp:cNvSpPr/>
+      </dsp:nvSpPr>
+      <dsp:spPr>
+        <a:xfrm>
+          <a:off x="4946294" y="1822126"/>
+          <a:ext cx="1149705" cy="987223"/>
+        </a:xfrm>
+        <a:prstGeom prst="hexagon">
+          <a:avLst>
+            <a:gd name="adj" fmla="val 25000"/>
+            <a:gd name="vf" fmla="val 115470"/>
+          </a:avLst>
+        </a:prstGeom>
+        <a:solidFill>
+          <a:schemeClr val="accent1">
+            <a:hueOff val="0"/>
+            <a:satOff val="0"/>
+            <a:lumOff val="0"/>
+            <a:alphaOff val="0"/>
+          </a:schemeClr>
+        </a:solidFill>
+        <a:ln w="12700" cap="flat" cmpd="sng" algn="ctr">
+          <a:solidFill>
+            <a:schemeClr val="accent1">
+              <a:hueOff val="0"/>
+              <a:satOff val="0"/>
+              <a:lumOff val="0"/>
+              <a:alphaOff val="0"/>
+            </a:schemeClr>
+          </a:solidFill>
+          <a:prstDash val="solid"/>
+          <a:miter lim="800000"/>
+        </a:ln>
+        <a:effectLst/>
+      </dsp:spPr>
+      <dsp:style>
+        <a:lnRef idx="2">
+          <a:scrgbClr r="0" g="0" b="0"/>
+        </a:lnRef>
+        <a:fillRef idx="1">
+          <a:scrgbClr r="0" g="0" b="0"/>
+        </a:fillRef>
+        <a:effectRef idx="0">
+          <a:scrgbClr r="0" g="0" b="0"/>
+        </a:effectRef>
+        <a:fontRef idx="minor">
+          <a:schemeClr val="lt1"/>
+        </a:fontRef>
+      </dsp:style>
+      <dsp:txBody>
+        <a:bodyPr spcFirstLastPara="0" vert="horz" wrap="square" lIns="0" tIns="19050" rIns="0" bIns="19050" numCol="1" spcCol="1270" anchor="ctr" anchorCtr="0">
+          <a:noAutofit/>
+        </a:bodyPr>
+        <a:lstStyle/>
+        <a:p>
+          <a:pPr lvl="0" algn="ctr" defTabSz="666750">
+            <a:lnSpc>
+              <a:spcPct val="90000"/>
+            </a:lnSpc>
+            <a:spcBef>
+              <a:spcPct val="0"/>
+            </a:spcBef>
+            <a:spcAft>
+              <a:spcPct val="35000"/>
+            </a:spcAft>
+          </a:pPr>
+          <a:r>
+            <a:rPr lang="en-US" sz="1500" kern="1200" dirty="0" smtClean="0"/>
+            <a:t>System 1</a:t>
+          </a:r>
+          <a:endParaRPr lang="en-US" sz="1500" kern="1200" dirty="0"/>
+        </a:p>
+      </dsp:txBody>
+      <dsp:txXfrm>
+        <a:off x="5124371" y="1975037"/>
+        <a:ext cx="793551" cy="681401"/>
+      </dsp:txXfrm>
+    </dsp:sp>
+    <dsp:sp modelId="{444A18DE-80DF-46F6-921D-FE2D7D2CC7F7}">
+      <dsp:nvSpPr>
+        <dsp:cNvPr id="0" name=""/>
+        <dsp:cNvSpPr/>
+      </dsp:nvSpPr>
+      <dsp:spPr>
+        <a:xfrm>
+          <a:off x="5174284" y="2686923"/>
+          <a:ext cx="134112" cy="115727"/>
+        </a:xfrm>
+        <a:prstGeom prst="hexagon">
+          <a:avLst>
+            <a:gd name="adj" fmla="val 25000"/>
+            <a:gd name="vf" fmla="val 115470"/>
+          </a:avLst>
+        </a:prstGeom>
+        <a:solidFill>
+          <a:schemeClr val="lt1">
+            <a:hueOff val="0"/>
+            <a:satOff val="0"/>
+            <a:lumOff val="0"/>
+            <a:alphaOff val="0"/>
+          </a:schemeClr>
+        </a:solidFill>
+        <a:ln w="12700" cap="flat" cmpd="sng" algn="ctr">
+          <a:solidFill>
+            <a:schemeClr val="accent1">
+              <a:hueOff val="0"/>
+              <a:satOff val="0"/>
+              <a:lumOff val="0"/>
+              <a:alphaOff val="0"/>
+            </a:schemeClr>
+          </a:solidFill>
+          <a:prstDash val="solid"/>
+          <a:miter lim="800000"/>
+        </a:ln>
+        <a:effectLst/>
+      </dsp:spPr>
+      <dsp:style>
+        <a:lnRef idx="2">
+          <a:scrgbClr r="0" g="0" b="0"/>
+        </a:lnRef>
+        <a:fillRef idx="1">
+          <a:scrgbClr r="0" g="0" b="0"/>
+        </a:fillRef>
+        <a:effectRef idx="0">
+          <a:scrgbClr r="0" g="0" b="0"/>
+        </a:effectRef>
+        <a:fontRef idx="minor"/>
+      </dsp:style>
+    </dsp:sp>
+    <dsp:sp modelId="{3CCF81BC-DF59-4242-B968-89DABE04FC17}">
+      <dsp:nvSpPr>
+        <dsp:cNvPr id="0" name=""/>
+        <dsp:cNvSpPr/>
+      </dsp:nvSpPr>
+      <dsp:spPr>
+        <a:xfrm>
+          <a:off x="3956913" y="2362810"/>
+          <a:ext cx="1149705" cy="987223"/>
+        </a:xfrm>
+        <a:prstGeom prst="hexagon">
+          <a:avLst>
+            <a:gd name="adj" fmla="val 25000"/>
+            <a:gd name="vf" fmla="val 115470"/>
+          </a:avLst>
+        </a:prstGeom>
+        <a:solidFill>
+          <a:schemeClr val="lt1">
+            <a:alpha val="90000"/>
+            <a:hueOff val="0"/>
+            <a:satOff val="0"/>
+            <a:lumOff val="0"/>
+            <a:alphaOff val="0"/>
+          </a:schemeClr>
+        </a:solidFill>
+        <a:ln w="12700" cap="flat" cmpd="sng" algn="ctr">
+          <a:solidFill>
+            <a:schemeClr val="accent1">
+              <a:hueOff val="0"/>
+              <a:satOff val="0"/>
+              <a:lumOff val="0"/>
+              <a:alphaOff val="0"/>
+            </a:schemeClr>
+          </a:solidFill>
+          <a:prstDash val="solid"/>
+          <a:miter lim="800000"/>
+        </a:ln>
+        <a:effectLst/>
+      </dsp:spPr>
+      <dsp:style>
+        <a:lnRef idx="2">
+          <a:scrgbClr r="0" g="0" b="0"/>
+        </a:lnRef>
+        <a:fillRef idx="1">
+          <a:scrgbClr r="0" g="0" b="0"/>
+        </a:fillRef>
+        <a:effectRef idx="0">
+          <a:scrgbClr r="0" g="0" b="0"/>
+        </a:effectRef>
+        <a:fontRef idx="minor"/>
+      </dsp:style>
+    </dsp:sp>
+    <dsp:sp modelId="{A4695D08-FB0B-4603-A37E-495B2E43E15F}">
+      <dsp:nvSpPr>
+        <dsp:cNvPr id="0" name=""/>
+        <dsp:cNvSpPr/>
+      </dsp:nvSpPr>
+      <dsp:spPr>
+        <a:xfrm>
+          <a:off x="4960924" y="2795953"/>
+          <a:ext cx="134112" cy="115727"/>
+        </a:xfrm>
+        <a:prstGeom prst="hexagon">
+          <a:avLst>
+            <a:gd name="adj" fmla="val 25000"/>
+            <a:gd name="vf" fmla="val 115470"/>
+          </a:avLst>
+        </a:prstGeom>
+        <a:solidFill>
+          <a:schemeClr val="lt1">
+            <a:hueOff val="0"/>
+            <a:satOff val="0"/>
+            <a:lumOff val="0"/>
+            <a:alphaOff val="0"/>
+          </a:schemeClr>
+        </a:solidFill>
+        <a:ln w="12700" cap="flat" cmpd="sng" algn="ctr">
+          <a:solidFill>
+            <a:schemeClr val="accent1">
+              <a:hueOff val="0"/>
+              <a:satOff val="0"/>
+              <a:lumOff val="0"/>
+              <a:alphaOff val="0"/>
+            </a:schemeClr>
+          </a:solidFill>
+          <a:prstDash val="solid"/>
+          <a:miter lim="800000"/>
+        </a:ln>
+        <a:effectLst/>
+      </dsp:spPr>
+      <dsp:style>
+        <a:lnRef idx="2">
+          <a:scrgbClr r="0" g="0" b="0"/>
+        </a:lnRef>
+        <a:fillRef idx="1">
+          <a:scrgbClr r="0" g="0" b="0"/>
+        </a:fillRef>
+        <a:effectRef idx="0">
+          <a:scrgbClr r="0" g="0" b="0"/>
+        </a:effectRef>
+        <a:fontRef idx="minor"/>
+      </dsp:style>
+    </dsp:sp>
+    <dsp:sp modelId="{0535AB3D-DD28-4FD4-87D5-C650B12C6B09}">
+      <dsp:nvSpPr>
+        <dsp:cNvPr id="0" name=""/>
+        <dsp:cNvSpPr/>
+      </dsp:nvSpPr>
+      <dsp:spPr>
+        <a:xfrm>
+          <a:off x="1977542" y="2356484"/>
+          <a:ext cx="1149705" cy="987223"/>
+        </a:xfrm>
+        <a:prstGeom prst="hexagon">
+          <a:avLst>
+            <a:gd name="adj" fmla="val 25000"/>
+            <a:gd name="vf" fmla="val 115470"/>
+          </a:avLst>
+        </a:prstGeom>
+        <a:solidFill>
+          <a:schemeClr val="accent1">
+            <a:hueOff val="0"/>
+            <a:satOff val="0"/>
+            <a:lumOff val="0"/>
+            <a:alphaOff val="0"/>
+          </a:schemeClr>
+        </a:solidFill>
+        <a:ln w="12700" cap="flat" cmpd="sng" algn="ctr">
+          <a:solidFill>
+            <a:schemeClr val="accent1">
+              <a:hueOff val="0"/>
+              <a:satOff val="0"/>
+              <a:lumOff val="0"/>
+              <a:alphaOff val="0"/>
+            </a:schemeClr>
+          </a:solidFill>
+          <a:prstDash val="solid"/>
+          <a:miter lim="800000"/>
+        </a:ln>
+        <a:effectLst/>
+      </dsp:spPr>
+      <dsp:style>
+        <a:lnRef idx="2">
+          <a:scrgbClr r="0" g="0" b="0"/>
+        </a:lnRef>
+        <a:fillRef idx="1">
+          <a:scrgbClr r="0" g="0" b="0"/>
+        </a:fillRef>
+        <a:effectRef idx="0">
+          <a:scrgbClr r="0" g="0" b="0"/>
+        </a:effectRef>
+        <a:fontRef idx="minor">
+          <a:schemeClr val="lt1"/>
+        </a:fontRef>
+      </dsp:style>
+      <dsp:txBody>
+        <a:bodyPr spcFirstLastPara="0" vert="horz" wrap="square" lIns="0" tIns="19050" rIns="0" bIns="19050" numCol="1" spcCol="1270" anchor="ctr" anchorCtr="0">
+          <a:noAutofit/>
+        </a:bodyPr>
+        <a:lstStyle/>
+        <a:p>
+          <a:pPr lvl="0" algn="ctr" defTabSz="666750">
+            <a:lnSpc>
+              <a:spcPct val="90000"/>
+            </a:lnSpc>
+            <a:spcBef>
+              <a:spcPct val="0"/>
+            </a:spcBef>
+            <a:spcAft>
+              <a:spcPct val="35000"/>
+            </a:spcAft>
+          </a:pPr>
+          <a:r>
+            <a:rPr lang="en-US" sz="1500" kern="1200" dirty="0" smtClean="0"/>
+            <a:t>System N</a:t>
+          </a:r>
+          <a:endParaRPr lang="en-US" sz="1500" kern="1200" dirty="0"/>
+        </a:p>
+      </dsp:txBody>
+      <dsp:txXfrm>
+        <a:off x="2155619" y="2509395"/>
+        <a:ext cx="793551" cy="681401"/>
+      </dsp:txXfrm>
+    </dsp:sp>
+    <dsp:sp modelId="{D66FA5B4-BC86-4747-BCCF-41972340E5A5}">
+      <dsp:nvSpPr>
+        <dsp:cNvPr id="0" name=""/>
+        <dsp:cNvSpPr/>
+      </dsp:nvSpPr>
+      <dsp:spPr>
+        <a:xfrm>
+          <a:off x="2010460" y="2794093"/>
+          <a:ext cx="134112" cy="115727"/>
+        </a:xfrm>
+        <a:prstGeom prst="hexagon">
+          <a:avLst>
+            <a:gd name="adj" fmla="val 25000"/>
+            <a:gd name="vf" fmla="val 115470"/>
+          </a:avLst>
+        </a:prstGeom>
+        <a:solidFill>
+          <a:schemeClr val="lt1">
+            <a:hueOff val="0"/>
+            <a:satOff val="0"/>
+            <a:lumOff val="0"/>
+            <a:alphaOff val="0"/>
+          </a:schemeClr>
+        </a:solidFill>
+        <a:ln w="12700" cap="flat" cmpd="sng" algn="ctr">
+          <a:solidFill>
+            <a:schemeClr val="accent1">
+              <a:hueOff val="0"/>
+              <a:satOff val="0"/>
+              <a:lumOff val="0"/>
+              <a:alphaOff val="0"/>
+            </a:schemeClr>
+          </a:solidFill>
+          <a:prstDash val="solid"/>
+          <a:miter lim="800000"/>
+        </a:ln>
+        <a:effectLst/>
+      </dsp:spPr>
+      <dsp:style>
+        <a:lnRef idx="2">
+          <a:scrgbClr r="0" g="0" b="0"/>
+        </a:lnRef>
+        <a:fillRef idx="1">
+          <a:scrgbClr r="0" g="0" b="0"/>
+        </a:fillRef>
+        <a:effectRef idx="0">
+          <a:scrgbClr r="0" g="0" b="0"/>
+        </a:effectRef>
+        <a:fontRef idx="minor"/>
+      </dsp:style>
+    </dsp:sp>
+    <dsp:sp modelId="{12603011-3D8F-4596-93B8-6C7F91400CD2}">
+      <dsp:nvSpPr>
+        <dsp:cNvPr id="0" name=""/>
+        <dsp:cNvSpPr/>
+      </dsp:nvSpPr>
+      <dsp:spPr>
+        <a:xfrm>
+          <a:off x="988771" y="2905355"/>
+          <a:ext cx="1149705" cy="987223"/>
+        </a:xfrm>
+        <a:prstGeom prst="hexagon">
+          <a:avLst>
+            <a:gd name="adj" fmla="val 25000"/>
+            <a:gd name="vf" fmla="val 115470"/>
+          </a:avLst>
+        </a:prstGeom>
+        <a:solidFill>
+          <a:schemeClr val="lt1">
+            <a:alpha val="90000"/>
+            <a:hueOff val="0"/>
+            <a:satOff val="0"/>
+            <a:lumOff val="0"/>
+            <a:alphaOff val="0"/>
+          </a:schemeClr>
+        </a:solidFill>
+        <a:ln w="12700" cap="flat" cmpd="sng" algn="ctr">
+          <a:solidFill>
+            <a:schemeClr val="accent1">
+              <a:hueOff val="0"/>
+              <a:satOff val="0"/>
+              <a:lumOff val="0"/>
+              <a:alphaOff val="0"/>
+            </a:schemeClr>
+          </a:solidFill>
+          <a:prstDash val="solid"/>
+          <a:miter lim="800000"/>
+        </a:ln>
+        <a:effectLst/>
+      </dsp:spPr>
+      <dsp:style>
+        <a:lnRef idx="2">
+          <a:scrgbClr r="0" g="0" b="0"/>
+        </a:lnRef>
+        <a:fillRef idx="1">
+          <a:scrgbClr r="0" g="0" b="0"/>
+        </a:fillRef>
+        <a:effectRef idx="0">
+          <a:scrgbClr r="0" g="0" b="0"/>
+        </a:effectRef>
+        <a:fontRef idx="minor"/>
+      </dsp:style>
+    </dsp:sp>
+    <dsp:sp modelId="{F14A6659-5344-42EA-BBA1-9494E1C07049}">
+      <dsp:nvSpPr>
+        <dsp:cNvPr id="0" name=""/>
+        <dsp:cNvSpPr/>
+      </dsp:nvSpPr>
+      <dsp:spPr>
+        <a:xfrm>
+          <a:off x="1770887" y="2919123"/>
+          <a:ext cx="134112" cy="115727"/>
+        </a:xfrm>
+        <a:prstGeom prst="hexagon">
+          <a:avLst>
+            <a:gd name="adj" fmla="val 25000"/>
+            <a:gd name="vf" fmla="val 115470"/>
+          </a:avLst>
+        </a:prstGeom>
+        <a:solidFill>
+          <a:schemeClr val="lt1">
+            <a:hueOff val="0"/>
+            <a:satOff val="0"/>
+            <a:lumOff val="0"/>
+            <a:alphaOff val="0"/>
+          </a:schemeClr>
+        </a:solidFill>
+        <a:ln w="12700" cap="flat" cmpd="sng" algn="ctr">
+          <a:solidFill>
+            <a:schemeClr val="accent1">
+              <a:hueOff val="0"/>
+              <a:satOff val="0"/>
+              <a:lumOff val="0"/>
+              <a:alphaOff val="0"/>
+            </a:schemeClr>
+          </a:solidFill>
+          <a:prstDash val="solid"/>
+          <a:miter lim="800000"/>
+        </a:ln>
+        <a:effectLst/>
+      </dsp:spPr>
+      <dsp:style>
+        <a:lnRef idx="2">
+          <a:scrgbClr r="0" g="0" b="0"/>
+        </a:lnRef>
+        <a:fillRef idx="1">
+          <a:scrgbClr r="0" g="0" b="0"/>
+        </a:fillRef>
+        <a:effectRef idx="0">
+          <a:scrgbClr r="0" g="0" b="0"/>
+        </a:effectRef>
+        <a:fontRef idx="minor"/>
+      </dsp:style>
+    </dsp:sp>
   </dsp:spTree>
 </dsp:drawing>
 </file>
@@ -15975,7 +17998,7 @@
           <a:p>
             <a:fld id="{A254CC92-A4AB-4748-8201-8CC8FC025F54}" type="datetimeFigureOut">
               <a:rPr lang="en-US" smtClean="0"/>
-              <a:t>2/1/2015</a:t>
+              <a:t>2/2/2015</a:t>
             </a:fld>
             <a:endParaRPr lang="en-US"/>
           </a:p>
@@ -16145,7 +18168,7 @@
           <a:p>
             <a:fld id="{A254CC92-A4AB-4748-8201-8CC8FC025F54}" type="datetimeFigureOut">
               <a:rPr lang="en-US" smtClean="0"/>
-              <a:t>2/1/2015</a:t>
+              <a:t>2/2/2015</a:t>
             </a:fld>
             <a:endParaRPr lang="en-US"/>
           </a:p>
@@ -16325,7 +18348,7 @@
           <a:p>
             <a:fld id="{A254CC92-A4AB-4748-8201-8CC8FC025F54}" type="datetimeFigureOut">
               <a:rPr lang="en-US" smtClean="0"/>
-              <a:t>2/1/2015</a:t>
+              <a:t>2/2/2015</a:t>
             </a:fld>
             <a:endParaRPr lang="en-US"/>
           </a:p>
@@ -16495,7 +18518,7 @@
           <a:p>
             <a:fld id="{A254CC92-A4AB-4748-8201-8CC8FC025F54}" type="datetimeFigureOut">
               <a:rPr lang="en-US" smtClean="0"/>
-              <a:t>2/1/2015</a:t>
+              <a:t>2/2/2015</a:t>
             </a:fld>
             <a:endParaRPr lang="en-US"/>
           </a:p>
@@ -16739,7 +18762,7 @@
           <a:p>
             <a:fld id="{A254CC92-A4AB-4748-8201-8CC8FC025F54}" type="datetimeFigureOut">
               <a:rPr lang="en-US" smtClean="0"/>
-              <a:t>2/1/2015</a:t>
+              <a:t>2/2/2015</a:t>
             </a:fld>
             <a:endParaRPr lang="en-US"/>
           </a:p>
@@ -16971,7 +18994,7 @@
           <a:p>
             <a:fld id="{A254CC92-A4AB-4748-8201-8CC8FC025F54}" type="datetimeFigureOut">
               <a:rPr lang="en-US" smtClean="0"/>
-              <a:t>2/1/2015</a:t>
+              <a:t>2/2/2015</a:t>
             </a:fld>
             <a:endParaRPr lang="en-US"/>
           </a:p>
@@ -17338,7 +19361,7 @@
           <a:p>
             <a:fld id="{A254CC92-A4AB-4748-8201-8CC8FC025F54}" type="datetimeFigureOut">
               <a:rPr lang="en-US" smtClean="0"/>
-              <a:t>2/1/2015</a:t>
+              <a:t>2/2/2015</a:t>
             </a:fld>
             <a:endParaRPr lang="en-US"/>
           </a:p>
@@ -17456,7 +19479,7 @@
           <a:p>
             <a:fld id="{A254CC92-A4AB-4748-8201-8CC8FC025F54}" type="datetimeFigureOut">
               <a:rPr lang="en-US" smtClean="0"/>
-              <a:t>2/1/2015</a:t>
+              <a:t>2/2/2015</a:t>
             </a:fld>
             <a:endParaRPr lang="en-US"/>
           </a:p>
@@ -17551,7 +19574,7 @@
           <a:p>
             <a:fld id="{A254CC92-A4AB-4748-8201-8CC8FC025F54}" type="datetimeFigureOut">
               <a:rPr lang="en-US" smtClean="0"/>
-              <a:t>2/1/2015</a:t>
+              <a:t>2/2/2015</a:t>
             </a:fld>
             <a:endParaRPr lang="en-US"/>
           </a:p>
@@ -17828,7 +19851,7 @@
           <a:p>
             <a:fld id="{A254CC92-A4AB-4748-8201-8CC8FC025F54}" type="datetimeFigureOut">
               <a:rPr lang="en-US" smtClean="0"/>
-              <a:t>2/1/2015</a:t>
+              <a:t>2/2/2015</a:t>
             </a:fld>
             <a:endParaRPr lang="en-US"/>
           </a:p>
@@ -18085,7 +20108,7 @@
           <a:p>
             <a:fld id="{A254CC92-A4AB-4748-8201-8CC8FC025F54}" type="datetimeFigureOut">
               <a:rPr lang="en-US" smtClean="0"/>
-              <a:t>2/1/2015</a:t>
+              <a:t>2/2/2015</a:t>
             </a:fld>
             <a:endParaRPr lang="en-US"/>
           </a:p>
@@ -18298,7 +20321,7 @@
           <a:p>
             <a:fld id="{A254CC92-A4AB-4748-8201-8CC8FC025F54}" type="datetimeFigureOut">
               <a:rPr lang="en-US" smtClean="0"/>
-              <a:t>2/1/2015</a:t>
+              <a:t>2/2/2015</a:t>
             </a:fld>
             <a:endParaRPr lang="en-US"/>
           </a:p>
@@ -19146,8 +21169,29 @@
           <a:p>
             <a:r>
               <a:rPr lang="en-US" dirty="0" smtClean="0"/>
-              <a:t>Programming languages made “components” – kind of – with interfaces</a:t>
+              <a:t>Programming languages </a:t>
             </a:r>
+            <a:r>
+              <a:rPr lang="en-US" dirty="0" smtClean="0"/>
+              <a:t>enabled software “components</a:t>
+            </a:r>
+            <a:r>
+              <a:rPr lang="en-US" dirty="0" smtClean="0"/>
+              <a:t>” </a:t>
+            </a:r>
+            <a:r>
+              <a:rPr lang="en-US" dirty="0" smtClean="0"/>
+              <a:t>… </a:t>
+            </a:r>
+            <a:r>
+              <a:rPr lang="en-US" dirty="0" smtClean="0"/>
+              <a:t>kind </a:t>
+            </a:r>
+            <a:r>
+              <a:rPr lang="en-US" dirty="0" smtClean="0"/>
+              <a:t>of … by using interfaces</a:t>
+            </a:r>
+            <a:endParaRPr lang="en-US" dirty="0" smtClean="0"/>
           </a:p>
           <a:p>
             <a:r>
@@ -19173,8 +21217,13 @@
             </a:r>
             <a:r>
               <a:rPr lang="en-US" dirty="0" smtClean="0"/>
-              <a:t> for younger people</a:t>
+              <a:t> for younger </a:t>
             </a:r>
+            <a:r>
+              <a:rPr lang="en-US" dirty="0" smtClean="0"/>
+              <a:t>people?</a:t>
+            </a:r>
+            <a:endParaRPr lang="en-US" dirty="0" smtClean="0"/>
           </a:p>
           <a:p>
             <a:r>
@@ -19414,7 +21463,11 @@
           <a:bodyPr/>
           <a:lstStyle/>
           <a:p>
-            <a:endParaRPr lang="en-US"/>
+            <a:r>
+              <a:rPr lang="en-US" dirty="0" smtClean="0"/>
+              <a:t>Don’t try and provide every type of connection</a:t>
+            </a:r>
+            <a:endParaRPr lang="en-US" dirty="0"/>
           </a:p>
         </p:txBody>
       </p:sp>
@@ -19434,7 +21487,7 @@
         </p:blipFill>
         <p:spPr>
           <a:xfrm>
-            <a:off x="2338387" y="2152650"/>
+            <a:off x="4638675" y="2096667"/>
             <a:ext cx="3876675" cy="2952750"/>
           </a:xfrm>
           <a:prstGeom prst="rect">
@@ -19442,6 +21495,41 @@
           </a:prstGeom>
         </p:spPr>
       </p:pic>
+      <p:sp>
+        <p:nvSpPr>
+          <p:cNvPr id="5" name="Content Placeholder 2"/>
+          <p:cNvSpPr>
+            <a:spLocks noGrp="1"/>
+          </p:cNvSpPr>
+          <p:nvPr>
+            <p:ph idx="1"/>
+          </p:nvPr>
+        </p:nvSpPr>
+        <p:spPr>
+          <a:xfrm>
+            <a:off x="628650" y="1825625"/>
+            <a:ext cx="3766068" cy="4351338"/>
+          </a:xfrm>
+        </p:spPr>
+        <p:txBody>
+          <a:bodyPr/>
+          <a:lstStyle/>
+          <a:p>
+            <a:r>
+              <a:rPr lang="en-US" dirty="0" smtClean="0"/>
+              <a:t>Instead, make devices conform to an interface</a:t>
+            </a:r>
+          </a:p>
+          <a:p>
+            <a:pPr lvl="1"/>
+            <a:r>
+              <a:rPr lang="en-US" dirty="0" smtClean="0"/>
+              <a:t>Like USB</a:t>
+            </a:r>
+            <a:endParaRPr lang="en-US" dirty="0"/>
+          </a:p>
+        </p:txBody>
+      </p:sp>
     </p:spTree>
     <p:extLst>
       <p:ext uri="{BB962C8B-B14F-4D97-AF65-F5344CB8AC3E}">
@@ -20227,7 +22315,15 @@
           <a:p>
             <a:r>
               <a:rPr lang="en-US" dirty="0" smtClean="0"/>
-              <a:t>Changes in lower layers do not impact those in higher layers</a:t>
+              <a:t>Changes in lower layers do not impact </a:t>
+            </a:r>
+            <a:r>
+              <a:rPr lang="en-US" dirty="0" smtClean="0"/>
+              <a:t>code in </a:t>
+            </a:r>
+            <a:r>
+              <a:rPr lang="en-US" dirty="0" smtClean="0"/>
+              <a:t>higher layers</a:t>
             </a:r>
             <a:endParaRPr lang="en-US" dirty="0"/>
           </a:p>
@@ -20299,14 +22395,30 @@
         <p:spPr/>
         <p:txBody>
           <a:bodyPr>
-            <a:normAutofit fontScale="92500" lnSpcReduction="10000"/>
+            <a:normAutofit fontScale="92500" lnSpcReduction="20000"/>
           </a:bodyPr>
           <a:lstStyle/>
           <a:p>
             <a:r>
               <a:rPr lang="en-US" dirty="0"/>
-              <a:t>Systems are not layered</a:t>
+              <a:t>Systems are not </a:t>
             </a:r>
+            <a:r>
+              <a:rPr lang="en-US" dirty="0" smtClean="0"/>
+              <a:t>layered – they are component based</a:t>
+            </a:r>
+          </a:p>
+          <a:p>
+            <a:pPr lvl="1"/>
+            <a:r>
+              <a:rPr lang="en-US" dirty="0" smtClean="0"/>
+              <a:t>Components provide </a:t>
+            </a:r>
+            <a:r>
+              <a:rPr lang="en-US" smtClean="0"/>
+              <a:t>a capability</a:t>
+            </a:r>
+            <a:endParaRPr lang="en-US" dirty="0"/>
           </a:p>
           <a:p>
             <a:r>
@@ -20611,14 +22723,22 @@
           <a:p>
             <a:r>
               <a:rPr lang="en-US" dirty="0" smtClean="0"/>
-              <a:t>Stop thinking of high versus low</a:t>
+              <a:t>Stop thinking of </a:t>
+            </a:r>
+            <a:r>
+              <a:rPr lang="en-US" dirty="0" smtClean="0"/>
+              <a:t>high versus low</a:t>
             </a:r>
             <a:br>
               <a:rPr lang="en-US" dirty="0" smtClean="0"/>
             </a:br>
             <a:r>
               <a:rPr lang="en-US" dirty="0" smtClean="0"/>
-              <a:t>Everything is peers</a:t>
+              <a:t>Everything </a:t>
+            </a:r>
+            <a:r>
+              <a:rPr lang="en-US" dirty="0" smtClean="0"/>
+              <a:t>is peers</a:t>
             </a:r>
             <a:endParaRPr lang="en-US" dirty="0"/>
           </a:p>

</xml_diff>